<commit_message>
Arrumar 16 e 17
</commit_message>
<xml_diff>
--- a/Artefatos/15. Arquitetura de Negócio para cada Cenário.pptx
+++ b/Artefatos/15. Arquitetura de Negócio para cada Cenário.pptx
@@ -6,10 +6,10 @@
   </p:sldMasterIdLst>
   <p:sldIdLst>
     <p:sldId id="256" r:id="rId2"/>
-    <p:sldId id="257" r:id="rId3"/>
-    <p:sldId id="258" r:id="rId4"/>
-    <p:sldId id="259" r:id="rId5"/>
-    <p:sldId id="260" r:id="rId6"/>
+    <p:sldId id="259" r:id="rId3"/>
+    <p:sldId id="263" r:id="rId4"/>
+    <p:sldId id="257" r:id="rId5"/>
+    <p:sldId id="264" r:id="rId6"/>
     <p:sldId id="261" r:id="rId7"/>
   </p:sldIdLst>
   <p:sldSz cx="9144000" cy="6858000" type="screen4x3"/>
@@ -1779,7 +1779,7 @@
                 </a:solidFill>
                 <a:latin typeface="Calibri"/>
               </a:rPr>
-              <a:t>5/6/2020</a:t>
+              <a:t>5/13/2020</a:t>
             </a:fld>
             <a:endParaRPr lang="en-US" sz="1200" b="0" strike="noStrike" spc="-1">
               <a:latin typeface="Times New Roman"/>
@@ -2988,8 +2988,8 @@
         </p:nvSpPr>
         <p:spPr>
           <a:xfrm>
-            <a:off x="5875920" y="1186560"/>
-            <a:ext cx="1987920" cy="2225380"/>
+            <a:off x="5834160" y="1287774"/>
+            <a:ext cx="1987920" cy="1569492"/>
           </a:xfrm>
           <a:prstGeom prst="rect">
             <a:avLst/>
@@ -3035,17 +3035,68 @@
               <a:buChar char="•"/>
             </a:pPr>
             <a:r>
-              <a:rPr lang="en-US" sz="2000" b="0" strike="noStrike" spc="-1" dirty="0">
+              <a:rPr lang="en-US" sz="2000" spc="-1" dirty="0" smtClean="0">
                 <a:solidFill>
                   <a:srgbClr val="000000"/>
                 </a:solidFill>
                 <a:latin typeface="Calibri"/>
               </a:rPr>
-              <a:t>Controle de estoque.</a:t>
+              <a:t>Fornecer mercadoria</a:t>
             </a:r>
-          </a:p>
-          <a:p>
-            <a:pPr marL="343080" indent="-342720">
+            <a:endParaRPr lang="en-US" sz="2000" b="0" strike="noStrike" spc="-1" dirty="0">
+              <a:latin typeface="Arial"/>
+            </a:endParaRPr>
+          </a:p>
+        </p:txBody>
+      </p:sp>
+      <p:sp>
+        <p:nvSpPr>
+          <p:cNvPr id="56" name="CustomShape 16"/>
+          <p:cNvSpPr/>
+          <p:nvPr/>
+        </p:nvSpPr>
+        <p:spPr>
+          <a:xfrm>
+            <a:off x="5834160" y="3952513"/>
+            <a:ext cx="2071440" cy="1929671"/>
+          </a:xfrm>
+          <a:prstGeom prst="rect">
+            <a:avLst/>
+          </a:prstGeom>
+          <a:ln>
+            <a:round/>
+          </a:ln>
+        </p:spPr>
+        <p:style>
+          <a:lnRef idx="2">
+            <a:schemeClr val="dk1"/>
+          </a:lnRef>
+          <a:fillRef idx="1">
+            <a:schemeClr val="lt1"/>
+          </a:fillRef>
+          <a:effectRef idx="0">
+            <a:schemeClr val="dk1"/>
+          </a:effectRef>
+          <a:fontRef idx="minor"/>
+        </p:style>
+        <p:txBody>
+          <a:bodyPr lIns="90000" tIns="45000" rIns="90000" bIns="45000" anchor="ctr"/>
+          <a:lstStyle/>
+          <a:p>
+            <a:pPr marL="360">
+              <a:lnSpc>
+                <a:spcPct val="100000"/>
+              </a:lnSpc>
+              <a:buClr>
+                <a:srgbClr val="000000"/>
+              </a:buClr>
+            </a:pPr>
+            <a:endParaRPr lang="en-US" sz="2000" b="0" strike="noStrike" spc="-1" dirty="0" smtClean="0">
+              <a:latin typeface="Arial"/>
+            </a:endParaRPr>
+          </a:p>
+          <a:p>
+            <a:pPr marL="285840" indent="-285480">
               <a:lnSpc>
                 <a:spcPct val="100000"/>
               </a:lnSpc>
@@ -3056,75 +3107,14 @@
               <a:buChar char="•"/>
             </a:pPr>
             <a:r>
-              <a:rPr lang="en-US" sz="2000" spc="-1" dirty="0">
+              <a:rPr lang="en-US" sz="2000" spc="-1" dirty="0" smtClean="0">
                 <a:solidFill>
                   <a:srgbClr val="000000"/>
                 </a:solidFill>
                 <a:latin typeface="Calibri"/>
               </a:rPr>
-              <a:t>Receber mercadoria</a:t>
+              <a:t>Solicitar orçamento.</a:t>
             </a:r>
-            <a:endParaRPr lang="en-US" sz="2000" b="0" strike="noStrike" spc="-1" dirty="0">
-              <a:latin typeface="Arial"/>
-            </a:endParaRPr>
-          </a:p>
-          <a:p>
-            <a:pPr algn="ctr">
-              <a:lnSpc>
-                <a:spcPct val="100000"/>
-              </a:lnSpc>
-            </a:pPr>
-            <a:endParaRPr lang="en-US" sz="2000" b="0" strike="noStrike" spc="-1" dirty="0">
-              <a:latin typeface="Arial"/>
-            </a:endParaRPr>
-          </a:p>
-        </p:txBody>
-      </p:sp>
-      <p:sp>
-        <p:nvSpPr>
-          <p:cNvPr id="56" name="CustomShape 16"/>
-          <p:cNvSpPr/>
-          <p:nvPr/>
-        </p:nvSpPr>
-        <p:spPr>
-          <a:xfrm>
-            <a:off x="5792400" y="3930556"/>
-            <a:ext cx="2071440" cy="1797410"/>
-          </a:xfrm>
-          <a:prstGeom prst="rect">
-            <a:avLst/>
-          </a:prstGeom>
-          <a:ln>
-            <a:round/>
-          </a:ln>
-        </p:spPr>
-        <p:style>
-          <a:lnRef idx="2">
-            <a:schemeClr val="dk1"/>
-          </a:lnRef>
-          <a:fillRef idx="1">
-            <a:schemeClr val="lt1"/>
-          </a:fillRef>
-          <a:effectRef idx="0">
-            <a:schemeClr val="dk1"/>
-          </a:effectRef>
-          <a:fontRef idx="minor"/>
-        </p:style>
-        <p:txBody>
-          <a:bodyPr lIns="90000" tIns="45000" rIns="90000" bIns="45000" anchor="ctr"/>
-          <a:lstStyle/>
-          <a:p>
-            <a:pPr marL="360">
-              <a:lnSpc>
-                <a:spcPct val="100000"/>
-              </a:lnSpc>
-              <a:buClr>
-                <a:srgbClr val="000000"/>
-              </a:buClr>
-            </a:pPr>
-            <a:endParaRPr lang="en-US" sz="2000" b="0" strike="noStrike" spc="-1" dirty="0">
-              <a:latin typeface="Arial"/>
-            </a:endParaRPr>
           </a:p>
           <a:p>
             <a:pPr marL="285840" indent="-285480">
@@ -3138,13 +3128,13 @@
               <a:buChar char="•"/>
             </a:pPr>
             <a:r>
-              <a:rPr lang="en-US" sz="2000" b="0" strike="noStrike" spc="-1" dirty="0">
+              <a:rPr lang="en-US" sz="2000" spc="-1" dirty="0" smtClean="0">
                 <a:solidFill>
                   <a:srgbClr val="000000"/>
                 </a:solidFill>
                 <a:latin typeface="Calibri"/>
               </a:rPr>
-              <a:t>Compra de produto.</a:t>
+              <a:t>Comprar produto.</a:t>
             </a:r>
           </a:p>
           <a:p>
@@ -3159,28 +3149,29 @@
               <a:buChar char="•"/>
             </a:pPr>
             <a:r>
-              <a:rPr lang="en-US" sz="2000" b="0" strike="noStrike" spc="-1" dirty="0">
+              <a:rPr lang="en-US" sz="2000" spc="-1" dirty="0" smtClean="0">
                 <a:solidFill>
                   <a:srgbClr val="000000"/>
                 </a:solidFill>
                 <a:latin typeface="Calibri"/>
               </a:rPr>
-              <a:t>Controle de vendas</a:t>
+              <a:t>Devolver produto</a:t>
             </a:r>
           </a:p>
           <a:p>
-            <a:pPr marL="285840" indent="-285480">
+            <a:pPr marL="360">
               <a:lnSpc>
                 <a:spcPct val="100000"/>
               </a:lnSpc>
               <a:buClr>
                 <a:srgbClr val="000000"/>
               </a:buClr>
-              <a:buFont typeface="Arial"/>
-              <a:buChar char="•"/>
-            </a:pPr>
-            <a:endParaRPr lang="en-US" sz="1800" b="0" strike="noStrike" spc="-1" dirty="0">
-              <a:latin typeface="Arial"/>
+            </a:pPr>
+            <a:endParaRPr lang="en-US" sz="2000" spc="-1" dirty="0" smtClean="0">
+              <a:solidFill>
+                <a:srgbClr val="000000"/>
+              </a:solidFill>
+              <a:latin typeface="Calibri"/>
             </a:endParaRPr>
           </a:p>
         </p:txBody>
@@ -3285,14 +3276,14 @@
       </p:grpSpPr>
       <p:sp>
         <p:nvSpPr>
-          <p:cNvPr id="59" name="CustomShape 1"/>
-          <p:cNvSpPr/>
-          <p:nvPr/>
-        </p:nvSpPr>
-        <p:spPr>
-          <a:xfrm>
-            <a:off x="3092760" y="332640"/>
-            <a:ext cx="2046600" cy="772200"/>
+          <p:cNvPr id="87" name="CustomShape 1"/>
+          <p:cNvSpPr/>
+          <p:nvPr/>
+        </p:nvSpPr>
+        <p:spPr>
+          <a:xfrm>
+            <a:off x="3092760" y="185400"/>
+            <a:ext cx="2046600" cy="919440"/>
           </a:xfrm>
           <a:prstGeom prst="rect">
             <a:avLst/>
@@ -3332,24 +3323,23 @@
                 <a:spcPct val="100000"/>
               </a:lnSpc>
             </a:pPr>
-            <a:endParaRPr lang="en-US" sz="1800" b="0" strike="noStrike" spc="-1" dirty="0">
-              <a:latin typeface="Arial"/>
-            </a:endParaRPr>
-          </a:p>
-          <a:p>
-            <a:pPr algn="ctr">
-              <a:lnSpc>
-                <a:spcPct val="100000"/>
-              </a:lnSpc>
-            </a:pPr>
             <a:r>
-              <a:rPr lang="en-US" sz="2000" b="1" strike="noStrike" spc="-1" dirty="0">
+              <a:rPr lang="en-US" sz="2000" b="1" spc="-1" dirty="0" smtClean="0">
                 <a:solidFill>
                   <a:srgbClr val="000000"/>
                 </a:solidFill>
                 <a:latin typeface="Calibri"/>
               </a:rPr>
-              <a:t>Compra de Produto</a:t>
+              <a:t>Fornecer </a:t>
+            </a:r>
+            <a:r>
+              <a:rPr lang="en-US" sz="2000" b="1" strike="noStrike" spc="-1" dirty="0" smtClean="0">
+                <a:solidFill>
+                  <a:srgbClr val="000000"/>
+                </a:solidFill>
+                <a:latin typeface="Calibri"/>
+              </a:rPr>
+              <a:t>mercadoria</a:t>
             </a:r>
             <a:endParaRPr lang="en-US" sz="2000" b="0" strike="noStrike" spc="-1" dirty="0">
               <a:latin typeface="Arial"/>
@@ -3369,7 +3359,7 @@
       </p:sp>
       <p:sp>
         <p:nvSpPr>
-          <p:cNvPr id="60" name="Line 2"/>
+          <p:cNvPr id="88" name="Line 2"/>
           <p:cNvSpPr/>
           <p:nvPr/>
         </p:nvSpPr>
@@ -3400,7 +3390,7 @@
       </p:sp>
       <p:sp>
         <p:nvSpPr>
-          <p:cNvPr id="61" name="CustomShape 3"/>
+          <p:cNvPr id="89" name="CustomShape 3"/>
           <p:cNvSpPr/>
           <p:nvPr/>
         </p:nvSpPr>
@@ -3456,7 +3446,7 @@
                 </a:solidFill>
                 <a:latin typeface="Calibri"/>
               </a:rPr>
-              <a:t>Balcão de atendimento </a:t>
+              <a:t>Almoxarifado</a:t>
             </a:r>
             <a:endParaRPr lang="en-US" sz="2000" b="0" strike="noStrike" spc="-1">
               <a:latin typeface="Arial"/>
@@ -3466,7 +3456,7 @@
       </p:sp>
       <p:sp>
         <p:nvSpPr>
-          <p:cNvPr id="62" name="CustomShape 4"/>
+          <p:cNvPr id="90" name="CustomShape 4"/>
           <p:cNvSpPr/>
           <p:nvPr/>
         </p:nvSpPr>
@@ -3497,7 +3487,7 @@
       </p:sp>
       <p:sp>
         <p:nvSpPr>
-          <p:cNvPr id="63" name="Line 5"/>
+          <p:cNvPr id="91" name="Line 5"/>
           <p:cNvSpPr/>
           <p:nvPr/>
         </p:nvSpPr>
@@ -3528,7 +3518,7 @@
       </p:sp>
       <p:sp>
         <p:nvSpPr>
-          <p:cNvPr id="64" name="Line 6"/>
+          <p:cNvPr id="92" name="Line 6"/>
           <p:cNvSpPr/>
           <p:nvPr/>
         </p:nvSpPr>
@@ -3559,7 +3549,7 @@
       </p:sp>
       <p:sp>
         <p:nvSpPr>
-          <p:cNvPr id="65" name="Line 7"/>
+          <p:cNvPr id="93" name="Line 7"/>
           <p:cNvSpPr/>
           <p:nvPr/>
         </p:nvSpPr>
@@ -3590,7 +3580,7 @@
       </p:sp>
       <p:sp>
         <p:nvSpPr>
-          <p:cNvPr id="66" name="Line 8"/>
+          <p:cNvPr id="94" name="Line 8"/>
           <p:cNvSpPr/>
           <p:nvPr/>
         </p:nvSpPr>
@@ -3621,7 +3611,7 @@
       </p:sp>
       <p:sp>
         <p:nvSpPr>
-          <p:cNvPr id="67" name="CustomShape 9"/>
+          <p:cNvPr id="95" name="CustomShape 9"/>
           <p:cNvSpPr/>
           <p:nvPr/>
         </p:nvSpPr>
@@ -3679,14 +3669,14 @@
       </p:sp>
       <p:sp>
         <p:nvSpPr>
-          <p:cNvPr id="68" name="CustomShape 10"/>
-          <p:cNvSpPr/>
-          <p:nvPr/>
-        </p:nvSpPr>
-        <p:spPr>
-          <a:xfrm>
-            <a:off x="7129800" y="3460320"/>
-            <a:ext cx="1086480" cy="364680"/>
+          <p:cNvPr id="96" name="CustomShape 10"/>
+          <p:cNvSpPr/>
+          <p:nvPr/>
+        </p:nvSpPr>
+        <p:spPr>
+          <a:xfrm>
+            <a:off x="7144200" y="3460320"/>
+            <a:ext cx="1387800" cy="638280"/>
           </a:xfrm>
           <a:prstGeom prst="rect">
             <a:avLst/>
@@ -3709,7 +3699,7 @@
           <a:fontRef idx="minor"/>
         </p:style>
         <p:txBody>
-          <a:bodyPr wrap="none" lIns="90000" tIns="45000" rIns="90000" bIns="45000"/>
+          <a:bodyPr lIns="90000" tIns="45000" rIns="90000" bIns="45000"/>
           <a:lstStyle/>
           <a:p>
             <a:pPr>
@@ -3724,7 +3714,7 @@
                 </a:solidFill>
                 <a:latin typeface="Calibri"/>
               </a:rPr>
-              <a:t>Cliente</a:t>
+              <a:t>Fornecedor</a:t>
             </a:r>
             <a:endParaRPr lang="en-US" sz="1800" b="0" strike="noStrike" spc="-1">
               <a:latin typeface="Arial"/>
@@ -3734,7 +3724,7 @@
       </p:sp>
       <p:sp>
         <p:nvSpPr>
-          <p:cNvPr id="69" name="CustomShape 11"/>
+          <p:cNvPr id="97" name="CustomShape 11"/>
           <p:cNvSpPr/>
           <p:nvPr/>
         </p:nvSpPr>
@@ -3818,7 +3808,7 @@
       </p:sp>
       <p:sp>
         <p:nvSpPr>
-          <p:cNvPr id="70" name="CustomShape 12"/>
+          <p:cNvPr id="98" name="CustomShape 12"/>
           <p:cNvSpPr/>
           <p:nvPr/>
         </p:nvSpPr>
@@ -3902,14 +3892,14 @@
       </p:sp>
       <p:sp>
         <p:nvSpPr>
-          <p:cNvPr id="71" name="CustomShape 13"/>
-          <p:cNvSpPr/>
-          <p:nvPr/>
-        </p:nvSpPr>
-        <p:spPr>
-          <a:xfrm>
-            <a:off x="3154320" y="4187519"/>
-            <a:ext cx="1987920" cy="1449005"/>
+          <p:cNvPr id="99" name="CustomShape 13"/>
+          <p:cNvSpPr/>
+          <p:nvPr/>
+        </p:nvSpPr>
+        <p:spPr>
+          <a:xfrm>
+            <a:off x="3001787" y="4372966"/>
+            <a:ext cx="2242800" cy="1427040"/>
           </a:xfrm>
           <a:prstGeom prst="rect">
             <a:avLst/>
@@ -3934,7 +3924,17 @@
           <a:bodyPr lIns="90000" tIns="45000" rIns="90000" bIns="45000" anchor="ctr"/>
           <a:lstStyle/>
           <a:p>
-            <a:pPr marL="285840" indent="-285480">
+            <a:pPr>
+              <a:lnSpc>
+                <a:spcPct val="100000"/>
+              </a:lnSpc>
+            </a:pPr>
+            <a:endParaRPr lang="en-US" sz="1800" b="0" strike="noStrike" spc="-1" dirty="0">
+              <a:latin typeface="Arial"/>
+            </a:endParaRPr>
+          </a:p>
+          <a:p>
+            <a:pPr marL="285750" indent="-285115">
               <a:lnSpc>
                 <a:spcPct val="100000"/>
               </a:lnSpc>
@@ -3951,7 +3951,37 @@
                 </a:solidFill>
                 <a:latin typeface="Calibri"/>
               </a:rPr>
-              <a:t>Registrar compra.</a:t>
+              <a:t>Conferir mercadoria</a:t>
+            </a:r>
+            <a:r>
+              <a:rPr lang="en-US" sz="2000" b="0" strike="noStrike" spc="-1" dirty="0" smtClean="0">
+                <a:solidFill>
+                  <a:srgbClr val="000000"/>
+                </a:solidFill>
+                <a:latin typeface="Calibri"/>
+              </a:rPr>
+              <a:t>.</a:t>
+            </a:r>
+          </a:p>
+          <a:p>
+            <a:pPr marL="285750" indent="-285115">
+              <a:lnSpc>
+                <a:spcPct val="100000"/>
+              </a:lnSpc>
+              <a:buClr>
+                <a:srgbClr val="000000"/>
+              </a:buClr>
+              <a:buFont typeface="Arial"/>
+              <a:buChar char="•"/>
+            </a:pPr>
+            <a:r>
+              <a:rPr lang="en-US" sz="2000" spc="-1" dirty="0" smtClean="0">
+                <a:solidFill>
+                  <a:srgbClr val="000000"/>
+                </a:solidFill>
+                <a:latin typeface="Calibri"/>
+              </a:rPr>
+              <a:t>Devolver mercadoria.</a:t>
             </a:r>
             <a:endParaRPr lang="en-US" sz="2000" b="0" strike="noStrike" spc="-1" dirty="0">
               <a:latin typeface="Arial"/>
@@ -3971,14 +4001,14 @@
       </p:sp>
       <p:sp>
         <p:nvSpPr>
-          <p:cNvPr id="72" name="Line 14"/>
-          <p:cNvSpPr/>
-          <p:nvPr/>
-        </p:nvSpPr>
-        <p:spPr>
-          <a:xfrm>
-            <a:off x="0" y="3829680"/>
-            <a:ext cx="9144000" cy="360"/>
+          <p:cNvPr id="101" name="Line 15"/>
+          <p:cNvSpPr/>
+          <p:nvPr/>
+        </p:nvSpPr>
+        <p:spPr>
+          <a:xfrm flipH="1" flipV="1">
+            <a:off x="0" y="3823560"/>
+            <a:ext cx="9144000" cy="6120"/>
           </a:xfrm>
           <a:prstGeom prst="line">
             <a:avLst/>
@@ -4002,17 +4032,20 @@
       </p:sp>
       <p:cxnSp>
         <p:nvCxnSpPr>
-          <p:cNvPr id="3" name="Conector reto 2"/>
-          <p:cNvCxnSpPr>
-            <a:stCxn id="61" idx="2"/>
-            <a:endCxn id="71" idx="0"/>
-          </p:cNvCxnSpPr>
+          <p:cNvPr id="2" name="Conector reto 1">
+            <a:extLst>
+              <a:ext uri="{FF2B5EF4-FFF2-40B4-BE49-F238E27FC236}">
+                <a16:creationId xmlns:a16="http://schemas.microsoft.com/office/drawing/2014/main" xmlns="" id="{B9301381-FC1B-4DC9-8FA8-0846A232EBF4}"/>
+              </a:ext>
+            </a:extLst>
+          </p:cNvPr>
+          <p:cNvCxnSpPr/>
           <p:nvPr/>
         </p:nvCxnSpPr>
         <p:spPr>
-          <a:xfrm>
-            <a:off x="4139640" y="2903760"/>
-            <a:ext cx="8640" cy="1283759"/>
+          <a:xfrm flipH="1">
+            <a:off x="4104161" y="2903760"/>
+            <a:ext cx="35479" cy="1458551"/>
           </a:xfrm>
           <a:prstGeom prst="line">
             <a:avLst/>
@@ -4092,7 +4125,7 @@
       </p:grpSpPr>
       <p:sp>
         <p:nvSpPr>
-          <p:cNvPr id="73" name="CustomShape 1"/>
+          <p:cNvPr id="59" name="CustomShape 1"/>
           <p:cNvSpPr/>
           <p:nvPr/>
         </p:nvSpPr>
@@ -4139,24 +4172,44 @@
                 <a:spcPct val="100000"/>
               </a:lnSpc>
             </a:pPr>
+            <a:endParaRPr lang="en-US" sz="1800" b="0" strike="noStrike" spc="-1" dirty="0">
+              <a:latin typeface="Arial"/>
+            </a:endParaRPr>
+          </a:p>
+          <a:p>
+            <a:pPr algn="ctr">
+              <a:lnSpc>
+                <a:spcPct val="100000"/>
+              </a:lnSpc>
+            </a:pPr>
             <a:r>
-              <a:rPr lang="en-US" sz="1800" b="1" strike="noStrike" spc="-1" dirty="0">
+              <a:rPr lang="en-US" sz="2000" b="1" strike="noStrike" spc="-1" dirty="0" smtClean="0">
                 <a:solidFill>
                   <a:srgbClr val="000000"/>
                 </a:solidFill>
                 <a:latin typeface="Calibri"/>
               </a:rPr>
-              <a:t>Controle de estoque</a:t>
+              <a:t>Solicitar orçamento</a:t>
             </a:r>
-            <a:endParaRPr lang="en-US" sz="1800" b="0" strike="noStrike" spc="-1" dirty="0">
+            <a:endParaRPr lang="en-US" sz="2000" b="0" strike="noStrike" spc="-1" dirty="0">
               <a:latin typeface="Arial"/>
             </a:endParaRPr>
           </a:p>
-        </p:txBody>
-      </p:sp>
-      <p:sp>
-        <p:nvSpPr>
-          <p:cNvPr id="74" name="Line 2"/>
+          <a:p>
+            <a:pPr algn="ctr">
+              <a:lnSpc>
+                <a:spcPct val="100000"/>
+              </a:lnSpc>
+            </a:pPr>
+            <a:endParaRPr lang="en-US" sz="2000" b="0" strike="noStrike" spc="-1" dirty="0">
+              <a:latin typeface="Arial"/>
+            </a:endParaRPr>
+          </a:p>
+        </p:txBody>
+      </p:sp>
+      <p:sp>
+        <p:nvSpPr>
+          <p:cNvPr id="60" name="Line 2"/>
           <p:cNvSpPr/>
           <p:nvPr/>
         </p:nvSpPr>
@@ -4187,7 +4240,7 @@
       </p:sp>
       <p:sp>
         <p:nvSpPr>
-          <p:cNvPr id="75" name="CustomShape 3"/>
+          <p:cNvPr id="61" name="CustomShape 3"/>
           <p:cNvSpPr/>
           <p:nvPr/>
         </p:nvSpPr>
@@ -4243,7 +4296,7 @@
                 </a:solidFill>
                 <a:latin typeface="Calibri"/>
               </a:rPr>
-              <a:t>Almoxarifado</a:t>
+              <a:t>Balcão de atendimento </a:t>
             </a:r>
             <a:endParaRPr lang="en-US" sz="2000" b="0" strike="noStrike" spc="-1">
               <a:latin typeface="Arial"/>
@@ -4253,7 +4306,7 @@
       </p:sp>
       <p:sp>
         <p:nvSpPr>
-          <p:cNvPr id="76" name="CustomShape 4"/>
+          <p:cNvPr id="62" name="CustomShape 4"/>
           <p:cNvSpPr/>
           <p:nvPr/>
         </p:nvSpPr>
@@ -4284,7 +4337,7 @@
       </p:sp>
       <p:sp>
         <p:nvSpPr>
-          <p:cNvPr id="77" name="Line 5"/>
+          <p:cNvPr id="63" name="Line 5"/>
           <p:cNvSpPr/>
           <p:nvPr/>
         </p:nvSpPr>
@@ -4315,7 +4368,7 @@
       </p:sp>
       <p:sp>
         <p:nvSpPr>
-          <p:cNvPr id="78" name="Line 6"/>
+          <p:cNvPr id="64" name="Line 6"/>
           <p:cNvSpPr/>
           <p:nvPr/>
         </p:nvSpPr>
@@ -4346,7 +4399,7 @@
       </p:sp>
       <p:sp>
         <p:nvSpPr>
-          <p:cNvPr id="79" name="Line 7"/>
+          <p:cNvPr id="65" name="Line 7"/>
           <p:cNvSpPr/>
           <p:nvPr/>
         </p:nvSpPr>
@@ -4377,7 +4430,7 @@
       </p:sp>
       <p:sp>
         <p:nvSpPr>
-          <p:cNvPr id="80" name="Line 8"/>
+          <p:cNvPr id="66" name="Line 8"/>
           <p:cNvSpPr/>
           <p:nvPr/>
         </p:nvSpPr>
@@ -4408,7 +4461,7 @@
       </p:sp>
       <p:sp>
         <p:nvSpPr>
-          <p:cNvPr id="81" name="CustomShape 9"/>
+          <p:cNvPr id="67" name="CustomShape 9"/>
           <p:cNvSpPr/>
           <p:nvPr/>
         </p:nvSpPr>
@@ -4466,14 +4519,14 @@
       </p:sp>
       <p:sp>
         <p:nvSpPr>
-          <p:cNvPr id="82" name="CustomShape 10"/>
-          <p:cNvSpPr/>
-          <p:nvPr/>
-        </p:nvSpPr>
-        <p:spPr>
-          <a:xfrm>
-            <a:off x="6849000" y="3269520"/>
-            <a:ext cx="1638000" cy="639000"/>
+          <p:cNvPr id="68" name="CustomShape 10"/>
+          <p:cNvSpPr/>
+          <p:nvPr/>
+        </p:nvSpPr>
+        <p:spPr>
+          <a:xfrm>
+            <a:off x="7129800" y="3460320"/>
+            <a:ext cx="1086480" cy="364680"/>
           </a:xfrm>
           <a:prstGeom prst="rect">
             <a:avLst/>
@@ -4511,27 +4564,17 @@
                 </a:solidFill>
                 <a:latin typeface="Calibri"/>
               </a:rPr>
-              <a:t>Fornecedor</a:t>
+              <a:t>Cliente</a:t>
             </a:r>
             <a:endParaRPr lang="en-US" sz="1800" b="0" strike="noStrike" spc="-1">
               <a:latin typeface="Arial"/>
             </a:endParaRPr>
           </a:p>
-          <a:p>
-            <a:pPr>
-              <a:lnSpc>
-                <a:spcPct val="100000"/>
-              </a:lnSpc>
-            </a:pPr>
-            <a:endParaRPr lang="en-US" sz="1800" b="0" strike="noStrike" spc="-1">
-              <a:latin typeface="Arial"/>
-            </a:endParaRPr>
-          </a:p>
-        </p:txBody>
-      </p:sp>
-      <p:sp>
-        <p:nvSpPr>
-          <p:cNvPr id="83" name="CustomShape 11"/>
+        </p:txBody>
+      </p:sp>
+      <p:sp>
+        <p:nvSpPr>
+          <p:cNvPr id="69" name="CustomShape 11"/>
           <p:cNvSpPr/>
           <p:nvPr/>
         </p:nvSpPr>
@@ -4615,7 +4658,7 @@
       </p:sp>
       <p:sp>
         <p:nvSpPr>
-          <p:cNvPr id="84" name="CustomShape 12"/>
+          <p:cNvPr id="70" name="CustomShape 12"/>
           <p:cNvSpPr/>
           <p:nvPr/>
         </p:nvSpPr>
@@ -4699,14 +4742,14 @@
       </p:sp>
       <p:sp>
         <p:nvSpPr>
-          <p:cNvPr id="85" name="CustomShape 13"/>
-          <p:cNvSpPr/>
-          <p:nvPr/>
-        </p:nvSpPr>
-        <p:spPr>
-          <a:xfrm>
-            <a:off x="2808180" y="4187923"/>
-            <a:ext cx="2662920" cy="1621397"/>
+          <p:cNvPr id="71" name="CustomShape 13"/>
+          <p:cNvSpPr/>
+          <p:nvPr/>
+        </p:nvSpPr>
+        <p:spPr>
+          <a:xfrm>
+            <a:off x="3154320" y="4187519"/>
+            <a:ext cx="1987920" cy="1449005"/>
           </a:xfrm>
           <a:prstGeom prst="rect">
             <a:avLst/>
@@ -4731,27 +4774,10 @@
           <a:bodyPr lIns="90000" tIns="45000" rIns="90000" bIns="45000" anchor="ctr"/>
           <a:lstStyle/>
           <a:p>
-            <a:pPr algn="ctr">
-              <a:lnSpc>
-                <a:spcPct val="100000"/>
-              </a:lnSpc>
-            </a:pPr>
-            <a:endParaRPr lang="en-US" sz="1800" b="0" strike="noStrike" spc="-1" dirty="0">
-              <a:latin typeface="Arial"/>
-            </a:endParaRPr>
-          </a:p>
-          <a:p>
-            <a:pPr>
-              <a:lnSpc>
-                <a:spcPct val="100000"/>
-              </a:lnSpc>
-            </a:pPr>
-            <a:endParaRPr lang="en-US" sz="1800" b="0" strike="noStrike" spc="-1" dirty="0">
-              <a:latin typeface="Arial"/>
-            </a:endParaRPr>
-          </a:p>
-          <a:p>
-            <a:pPr marL="285750" indent="-285115">
+            <a:pPr marL="285840" indent="-285480">
+              <a:lnSpc>
+                <a:spcPct val="100000"/>
+              </a:lnSpc>
               <a:buClr>
                 <a:srgbClr val="000000"/>
               </a:buClr>
@@ -4759,44 +4785,16 @@
               <a:buChar char="•"/>
             </a:pPr>
             <a:r>
-              <a:rPr lang="en-US" spc="-1" dirty="0" err="1">
+              <a:rPr lang="en-US" sz="2000" b="0" strike="noStrike" spc="-1" dirty="0" smtClean="0">
+                <a:solidFill>
+                  <a:srgbClr val="000000"/>
+                </a:solidFill>
                 <a:latin typeface="Calibri"/>
               </a:rPr>
-              <a:t>Gerenciar</a:t>
+              <a:t>Fazer orçamento</a:t>
             </a:r>
-            <a:r>
-              <a:rPr lang="en-US" spc="-1" dirty="0">
-                <a:latin typeface="Calibri"/>
-              </a:rPr>
-              <a:t> </a:t>
-            </a:r>
-            <a:r>
-              <a:rPr lang="en-US" spc="-1" dirty="0" err="1">
-                <a:latin typeface="Calibri"/>
-              </a:rPr>
-              <a:t>estoque</a:t>
-            </a:r>
-            <a:r>
-              <a:rPr lang="en-US" spc="-1" dirty="0">
-                <a:latin typeface="Calibri"/>
-              </a:rPr>
-              <a:t>.</a:t>
-            </a:r>
-            <a:endParaRPr lang="en-US" sz="1800" b="0" strike="noStrike" spc="-1" dirty="0">
-              <a:latin typeface="Calibri"/>
-            </a:endParaRPr>
-          </a:p>
-          <a:p>
-            <a:pPr marL="635">
-              <a:lnSpc>
-                <a:spcPct val="100000"/>
-              </a:lnSpc>
-              <a:buClr>
-                <a:srgbClr val="000000"/>
-              </a:buClr>
-            </a:pPr>
-            <a:endParaRPr lang="en-US" sz="1800" b="0" strike="noStrike" spc="-1" dirty="0">
-              <a:latin typeface="Calibri"/>
+            <a:endParaRPr lang="en-US" sz="2000" b="0" strike="noStrike" spc="-1" dirty="0">
+              <a:latin typeface="Arial"/>
             </a:endParaRPr>
           </a:p>
           <a:p>
@@ -4805,31 +4803,21 @@
                 <a:spcPct val="100000"/>
               </a:lnSpc>
             </a:pPr>
-            <a:endParaRPr lang="en-US" sz="1800" b="0" strike="noStrike" spc="-1" dirty="0">
+            <a:endParaRPr lang="en-US" sz="2000" b="0" strike="noStrike" spc="-1" dirty="0">
               <a:latin typeface="Arial"/>
             </a:endParaRPr>
           </a:p>
-          <a:p>
-            <a:pPr algn="ctr">
-              <a:lnSpc>
-                <a:spcPct val="100000"/>
-              </a:lnSpc>
-            </a:pPr>
-            <a:endParaRPr lang="en-US" sz="1800" b="0" strike="noStrike" spc="-1" dirty="0">
-              <a:latin typeface="Arial"/>
-            </a:endParaRPr>
-          </a:p>
-        </p:txBody>
-      </p:sp>
-      <p:sp>
-        <p:nvSpPr>
-          <p:cNvPr id="86" name="Line 14"/>
-          <p:cNvSpPr/>
-          <p:nvPr/>
-        </p:nvSpPr>
-        <p:spPr>
-          <a:xfrm>
-            <a:off x="0" y="3783240"/>
+        </p:txBody>
+      </p:sp>
+      <p:sp>
+        <p:nvSpPr>
+          <p:cNvPr id="72" name="Line 14"/>
+          <p:cNvSpPr/>
+          <p:nvPr/>
+        </p:nvSpPr>
+        <p:spPr>
+          <a:xfrm>
+            <a:off x="0" y="3829680"/>
             <a:ext cx="9144000" cy="360"/>
           </a:xfrm>
           <a:prstGeom prst="line">
@@ -4856,14 +4844,15 @@
         <p:nvCxnSpPr>
           <p:cNvPr id="3" name="Conector reto 2"/>
           <p:cNvCxnSpPr>
-            <a:stCxn id="75" idx="2"/>
+            <a:stCxn id="61" idx="2"/>
+            <a:endCxn id="71" idx="0"/>
           </p:cNvCxnSpPr>
           <p:nvPr/>
         </p:nvCxnSpPr>
         <p:spPr>
-          <a:xfrm flipH="1">
-            <a:off x="4128480" y="2903760"/>
-            <a:ext cx="11160" cy="1272240"/>
+          <a:xfrm>
+            <a:off x="4139640" y="2903760"/>
+            <a:ext cx="8640" cy="1283759"/>
           </a:xfrm>
           <a:prstGeom prst="line">
             <a:avLst/>
@@ -4890,6 +4879,11 @@
         </p:style>
       </p:cxnSp>
     </p:spTree>
+    <p:extLst>
+      <p:ext uri="{BB962C8B-B14F-4D97-AF65-F5344CB8AC3E}">
+        <p14:creationId xmlns:p14="http://schemas.microsoft.com/office/powerpoint/2010/main" val="3299249500"/>
+      </p:ext>
+    </p:extLst>
   </p:cSld>
   <p:clrMapOvr>
     <a:masterClrMapping/>
@@ -4943,7 +4937,7 @@
       </p:grpSpPr>
       <p:sp>
         <p:nvSpPr>
-          <p:cNvPr id="87" name="CustomShape 1"/>
+          <p:cNvPr id="59" name="CustomShape 1"/>
           <p:cNvSpPr/>
           <p:nvPr/>
         </p:nvSpPr>
@@ -4990,14 +4984,60 @@
                 <a:spcPct val="100000"/>
               </a:lnSpc>
             </a:pPr>
+            <a:endParaRPr lang="en-US" sz="1800" b="0" strike="noStrike" spc="-1" dirty="0">
+              <a:latin typeface="Arial"/>
+            </a:endParaRPr>
+          </a:p>
+          <a:p>
+            <a:pPr algn="ctr">
+              <a:lnSpc>
+                <a:spcPct val="100000"/>
+              </a:lnSpc>
+            </a:pPr>
             <a:r>
-              <a:rPr lang="en-US" sz="2000" b="1" strike="noStrike" spc="-1" dirty="0">
+              <a:rPr lang="en-US" sz="2000" b="1" strike="noStrike" spc="-1" dirty="0" smtClean="0">
                 <a:solidFill>
                   <a:srgbClr val="000000"/>
                 </a:solidFill>
                 <a:latin typeface="Calibri"/>
               </a:rPr>
-              <a:t>Receber mercadoria</a:t>
+              <a:t>Compra</a:t>
+            </a:r>
+            <a:r>
+              <a:rPr lang="en-US" sz="2000" b="1" spc="-1" dirty="0">
+                <a:solidFill>
+                  <a:srgbClr val="000000"/>
+                </a:solidFill>
+                <a:latin typeface="Calibri"/>
+              </a:rPr>
+              <a:t>r</a:t>
+            </a:r>
+            <a:r>
+              <a:rPr lang="en-US" sz="2000" b="1" strike="noStrike" spc="-1" dirty="0" smtClean="0">
+                <a:solidFill>
+                  <a:srgbClr val="000000"/>
+                </a:solidFill>
+                <a:latin typeface="Calibri"/>
+              </a:rPr>
+              <a:t> </a:t>
+            </a:r>
+            <a:r>
+              <a:rPr lang="en-US" sz="2000" b="1" spc="-1" dirty="0">
+                <a:solidFill>
+                  <a:srgbClr val="000000"/>
+                </a:solidFill>
+                <a:latin typeface="Calibri"/>
+              </a:rPr>
+              <a:t>p</a:t>
+            </a:r>
+            <a:r>
+              <a:rPr lang="en-US" sz="2000" b="1" strike="noStrike" spc="-1" dirty="0" smtClean="0">
+                <a:solidFill>
+                  <a:srgbClr val="000000"/>
+                </a:solidFill>
+                <a:latin typeface="Calibri"/>
+              </a:rPr>
+              <a:t>roduto</a:t>
             </a:r>
             <a:endParaRPr lang="en-US" sz="2000" b="0" strike="noStrike" spc="-1" dirty="0">
               <a:latin typeface="Arial"/>
@@ -5017,7 +5057,7 @@
       </p:sp>
       <p:sp>
         <p:nvSpPr>
-          <p:cNvPr id="88" name="Line 2"/>
+          <p:cNvPr id="60" name="Line 2"/>
           <p:cNvSpPr/>
           <p:nvPr/>
         </p:nvSpPr>
@@ -5048,7 +5088,7 @@
       </p:sp>
       <p:sp>
         <p:nvSpPr>
-          <p:cNvPr id="89" name="CustomShape 3"/>
+          <p:cNvPr id="61" name="CustomShape 3"/>
           <p:cNvSpPr/>
           <p:nvPr/>
         </p:nvSpPr>
@@ -5104,7 +5144,7 @@
                 </a:solidFill>
                 <a:latin typeface="Calibri"/>
               </a:rPr>
-              <a:t>Almoxarifado</a:t>
+              <a:t>Balcão de atendimento </a:t>
             </a:r>
             <a:endParaRPr lang="en-US" sz="2000" b="0" strike="noStrike" spc="-1">
               <a:latin typeface="Arial"/>
@@ -5114,7 +5154,7 @@
       </p:sp>
       <p:sp>
         <p:nvSpPr>
-          <p:cNvPr id="90" name="CustomShape 4"/>
+          <p:cNvPr id="62" name="CustomShape 4"/>
           <p:cNvSpPr/>
           <p:nvPr/>
         </p:nvSpPr>
@@ -5145,7 +5185,7 @@
       </p:sp>
       <p:sp>
         <p:nvSpPr>
-          <p:cNvPr id="91" name="Line 5"/>
+          <p:cNvPr id="63" name="Line 5"/>
           <p:cNvSpPr/>
           <p:nvPr/>
         </p:nvSpPr>
@@ -5176,7 +5216,7 @@
       </p:sp>
       <p:sp>
         <p:nvSpPr>
-          <p:cNvPr id="92" name="Line 6"/>
+          <p:cNvPr id="64" name="Line 6"/>
           <p:cNvSpPr/>
           <p:nvPr/>
         </p:nvSpPr>
@@ -5207,7 +5247,7 @@
       </p:sp>
       <p:sp>
         <p:nvSpPr>
-          <p:cNvPr id="93" name="Line 7"/>
+          <p:cNvPr id="65" name="Line 7"/>
           <p:cNvSpPr/>
           <p:nvPr/>
         </p:nvSpPr>
@@ -5238,7 +5278,7 @@
       </p:sp>
       <p:sp>
         <p:nvSpPr>
-          <p:cNvPr id="94" name="Line 8"/>
+          <p:cNvPr id="66" name="Line 8"/>
           <p:cNvSpPr/>
           <p:nvPr/>
         </p:nvSpPr>
@@ -5269,7 +5309,7 @@
       </p:sp>
       <p:sp>
         <p:nvSpPr>
-          <p:cNvPr id="95" name="CustomShape 9"/>
+          <p:cNvPr id="67" name="CustomShape 9"/>
           <p:cNvSpPr/>
           <p:nvPr/>
         </p:nvSpPr>
@@ -5327,14 +5367,14 @@
       </p:sp>
       <p:sp>
         <p:nvSpPr>
-          <p:cNvPr id="96" name="CustomShape 10"/>
-          <p:cNvSpPr/>
-          <p:nvPr/>
-        </p:nvSpPr>
-        <p:spPr>
-          <a:xfrm>
-            <a:off x="7144200" y="3460320"/>
-            <a:ext cx="1387800" cy="638280"/>
+          <p:cNvPr id="68" name="CustomShape 10"/>
+          <p:cNvSpPr/>
+          <p:nvPr/>
+        </p:nvSpPr>
+        <p:spPr>
+          <a:xfrm>
+            <a:off x="7129800" y="3460320"/>
+            <a:ext cx="1086480" cy="364680"/>
           </a:xfrm>
           <a:prstGeom prst="rect">
             <a:avLst/>
@@ -5357,7 +5397,7 @@
           <a:fontRef idx="minor"/>
         </p:style>
         <p:txBody>
-          <a:bodyPr lIns="90000" tIns="45000" rIns="90000" bIns="45000"/>
+          <a:bodyPr wrap="none" lIns="90000" tIns="45000" rIns="90000" bIns="45000"/>
           <a:lstStyle/>
           <a:p>
             <a:pPr>
@@ -5372,7 +5412,7 @@
                 </a:solidFill>
                 <a:latin typeface="Calibri"/>
               </a:rPr>
-              <a:t>Fornecedor</a:t>
+              <a:t>Cliente</a:t>
             </a:r>
             <a:endParaRPr lang="en-US" sz="1800" b="0" strike="noStrike" spc="-1">
               <a:latin typeface="Arial"/>
@@ -5382,7 +5422,7 @@
       </p:sp>
       <p:sp>
         <p:nvSpPr>
-          <p:cNvPr id="97" name="CustomShape 11"/>
+          <p:cNvPr id="69" name="CustomShape 11"/>
           <p:cNvSpPr/>
           <p:nvPr/>
         </p:nvSpPr>
@@ -5466,7 +5506,7 @@
       </p:sp>
       <p:sp>
         <p:nvSpPr>
-          <p:cNvPr id="98" name="CustomShape 12"/>
+          <p:cNvPr id="70" name="CustomShape 12"/>
           <p:cNvSpPr/>
           <p:nvPr/>
         </p:nvSpPr>
@@ -5550,14 +5590,14 @@
       </p:sp>
       <p:sp>
         <p:nvSpPr>
-          <p:cNvPr id="99" name="CustomShape 13"/>
-          <p:cNvSpPr/>
-          <p:nvPr/>
-        </p:nvSpPr>
-        <p:spPr>
-          <a:xfrm>
-            <a:off x="3001787" y="4372966"/>
-            <a:ext cx="2242800" cy="1427040"/>
+          <p:cNvPr id="71" name="CustomShape 13"/>
+          <p:cNvSpPr/>
+          <p:nvPr/>
+        </p:nvSpPr>
+        <p:spPr>
+          <a:xfrm>
+            <a:off x="3134520" y="4484420"/>
+            <a:ext cx="1987920" cy="1682479"/>
           </a:xfrm>
           <a:prstGeom prst="rect">
             <a:avLst/>
@@ -5582,17 +5622,7 @@
           <a:bodyPr lIns="90000" tIns="45000" rIns="90000" bIns="45000" anchor="ctr"/>
           <a:lstStyle/>
           <a:p>
-            <a:pPr>
-              <a:lnSpc>
-                <a:spcPct val="100000"/>
-              </a:lnSpc>
-            </a:pPr>
-            <a:endParaRPr lang="en-US" sz="1800" b="0" strike="noStrike" spc="-1" dirty="0">
-              <a:latin typeface="Arial"/>
-            </a:endParaRPr>
-          </a:p>
-          <a:p>
-            <a:pPr marL="285750" indent="-285115">
+            <a:pPr marL="285840" indent="-285480">
               <a:lnSpc>
                 <a:spcPct val="100000"/>
               </a:lnSpc>
@@ -5602,15 +5632,6 @@
               <a:buFont typeface="Arial"/>
               <a:buChar char="•"/>
             </a:pPr>
-            <a:r>
-              <a:rPr lang="en-US" sz="2000" b="0" strike="noStrike" spc="-1" dirty="0" err="1">
-                <a:solidFill>
-                  <a:srgbClr val="000000"/>
-                </a:solidFill>
-                <a:latin typeface="Calibri"/>
-              </a:rPr>
-              <a:t>Conferir</a:t>
-            </a:r>
             <a:r>
               <a:rPr lang="en-US" sz="2000" b="0" strike="noStrike" spc="-1" dirty="0">
                 <a:solidFill>
@@ -5618,34 +5639,40 @@
                 </a:solidFill>
                 <a:latin typeface="Calibri"/>
               </a:rPr>
-              <a:t> mercadoria.</a:t>
+              <a:t>Registrar compra</a:t>
             </a:r>
+            <a:r>
+              <a:rPr lang="en-US" sz="2000" b="0" strike="noStrike" spc="-1" dirty="0" smtClean="0">
+                <a:solidFill>
+                  <a:srgbClr val="000000"/>
+                </a:solidFill>
+                <a:latin typeface="Calibri"/>
+              </a:rPr>
+              <a:t>.</a:t>
+            </a:r>
+          </a:p>
+          <a:p>
+            <a:pPr algn="ctr">
+              <a:lnSpc>
+                <a:spcPct val="100000"/>
+              </a:lnSpc>
+            </a:pPr>
             <a:endParaRPr lang="en-US" sz="2000" b="0" strike="noStrike" spc="-1" dirty="0">
               <a:latin typeface="Arial"/>
             </a:endParaRPr>
           </a:p>
-          <a:p>
-            <a:pPr algn="ctr">
-              <a:lnSpc>
-                <a:spcPct val="100000"/>
-              </a:lnSpc>
-            </a:pPr>
-            <a:endParaRPr lang="en-US" sz="2000" b="0" strike="noStrike" spc="-1" dirty="0">
-              <a:latin typeface="Arial"/>
-            </a:endParaRPr>
-          </a:p>
-        </p:txBody>
-      </p:sp>
-      <p:sp>
-        <p:nvSpPr>
-          <p:cNvPr id="101" name="Line 15"/>
-          <p:cNvSpPr/>
-          <p:nvPr/>
-        </p:nvSpPr>
-        <p:spPr>
-          <a:xfrm flipH="1" flipV="1">
-            <a:off x="0" y="3823560"/>
-            <a:ext cx="9144000" cy="6120"/>
+        </p:txBody>
+      </p:sp>
+      <p:sp>
+        <p:nvSpPr>
+          <p:cNvPr id="72" name="Line 14"/>
+          <p:cNvSpPr/>
+          <p:nvPr/>
+        </p:nvSpPr>
+        <p:spPr>
+          <a:xfrm>
+            <a:off x="0" y="3829680"/>
+            <a:ext cx="9144000" cy="360"/>
           </a:xfrm>
           <a:prstGeom prst="line">
             <a:avLst/>
@@ -5669,20 +5696,17 @@
       </p:sp>
       <p:cxnSp>
         <p:nvCxnSpPr>
-          <p:cNvPr id="2" name="Conector reto 1">
-            <a:extLst>
-              <a:ext uri="{FF2B5EF4-FFF2-40B4-BE49-F238E27FC236}">
-                <a16:creationId xmlns:a16="http://schemas.microsoft.com/office/drawing/2014/main" id="{B9301381-FC1B-4DC9-8FA8-0846A232EBF4}"/>
-              </a:ext>
-            </a:extLst>
-          </p:cNvPr>
-          <p:cNvCxnSpPr/>
+          <p:cNvPr id="3" name="Conector reto 2"/>
+          <p:cNvCxnSpPr>
+            <a:stCxn id="61" idx="2"/>
+            <a:endCxn id="71" idx="0"/>
+          </p:cNvCxnSpPr>
           <p:nvPr/>
         </p:nvCxnSpPr>
         <p:spPr>
           <a:xfrm flipH="1">
-            <a:off x="4104161" y="2903760"/>
-            <a:ext cx="35479" cy="1458551"/>
+            <a:off x="4128480" y="2903760"/>
+            <a:ext cx="11160" cy="1580660"/>
           </a:xfrm>
           <a:prstGeom prst="line">
             <a:avLst/>
@@ -5762,7 +5786,7 @@
       </p:grpSpPr>
       <p:sp>
         <p:nvSpPr>
-          <p:cNvPr id="102" name="CustomShape 1"/>
+          <p:cNvPr id="59" name="CustomShape 1"/>
           <p:cNvSpPr/>
           <p:nvPr/>
         </p:nvSpPr>
@@ -5820,13 +5844,31 @@
               </a:lnSpc>
             </a:pPr>
             <a:r>
-              <a:rPr lang="en-US" sz="2000" b="1" strike="noStrike" spc="-1" dirty="0">
+              <a:rPr lang="en-US" sz="2000" b="1" strike="noStrike" spc="-1" dirty="0" smtClean="0">
                 <a:solidFill>
                   <a:srgbClr val="000000"/>
                 </a:solidFill>
                 <a:latin typeface="Calibri"/>
               </a:rPr>
-              <a:t>Controle de vendas</a:t>
+              <a:t>Devolver </a:t>
+            </a:r>
+            <a:r>
+              <a:rPr lang="en-US" sz="2000" b="1" spc="-1" dirty="0">
+                <a:solidFill>
+                  <a:srgbClr val="000000"/>
+                </a:solidFill>
+                <a:latin typeface="Calibri"/>
+              </a:rPr>
+              <a:t>p</a:t>
+            </a:r>
+            <a:r>
+              <a:rPr lang="en-US" sz="2000" b="1" strike="noStrike" spc="-1" dirty="0" smtClean="0">
+                <a:solidFill>
+                  <a:srgbClr val="000000"/>
+                </a:solidFill>
+                <a:latin typeface="Calibri"/>
+              </a:rPr>
+              <a:t>roduto</a:t>
             </a:r>
             <a:endParaRPr lang="en-US" sz="2000" b="0" strike="noStrike" spc="-1" dirty="0">
               <a:latin typeface="Arial"/>
@@ -5846,7 +5888,7 @@
       </p:sp>
       <p:sp>
         <p:nvSpPr>
-          <p:cNvPr id="103" name="Line 2"/>
+          <p:cNvPr id="60" name="Line 2"/>
           <p:cNvSpPr/>
           <p:nvPr/>
         </p:nvSpPr>
@@ -5877,7 +5919,7 @@
       </p:sp>
       <p:sp>
         <p:nvSpPr>
-          <p:cNvPr id="104" name="CustomShape 3"/>
+          <p:cNvPr id="61" name="CustomShape 3"/>
           <p:cNvSpPr/>
           <p:nvPr/>
         </p:nvSpPr>
@@ -5927,15 +5969,15 @@
               </a:lnSpc>
             </a:pPr>
             <a:r>
-              <a:rPr lang="en-US" sz="2000" b="1" spc="-1" dirty="0" err="1">
+              <a:rPr lang="en-US" sz="2000" b="1" strike="noStrike" spc="-1">
                 <a:solidFill>
                   <a:srgbClr val="000000"/>
                 </a:solidFill>
                 <a:latin typeface="Calibri"/>
               </a:rPr>
-              <a:t>Gerência</a:t>
+              <a:t>Balcão de atendimento </a:t>
             </a:r>
-            <a:endParaRPr lang="en-US" sz="2000" b="0" strike="noStrike" spc="-1" dirty="0" err="1">
+            <a:endParaRPr lang="en-US" sz="2000" b="0" strike="noStrike" spc="-1">
               <a:latin typeface="Arial"/>
             </a:endParaRPr>
           </a:p>
@@ -5943,7 +5985,7 @@
       </p:sp>
       <p:sp>
         <p:nvSpPr>
-          <p:cNvPr id="105" name="CustomShape 4"/>
+          <p:cNvPr id="62" name="CustomShape 4"/>
           <p:cNvSpPr/>
           <p:nvPr/>
         </p:nvSpPr>
@@ -5974,7 +6016,7 @@
       </p:sp>
       <p:sp>
         <p:nvSpPr>
-          <p:cNvPr id="106" name="Line 5"/>
+          <p:cNvPr id="63" name="Line 5"/>
           <p:cNvSpPr/>
           <p:nvPr/>
         </p:nvSpPr>
@@ -6005,7 +6047,7 @@
       </p:sp>
       <p:sp>
         <p:nvSpPr>
-          <p:cNvPr id="107" name="Line 6"/>
+          <p:cNvPr id="64" name="Line 6"/>
           <p:cNvSpPr/>
           <p:nvPr/>
         </p:nvSpPr>
@@ -6036,7 +6078,7 @@
       </p:sp>
       <p:sp>
         <p:nvSpPr>
-          <p:cNvPr id="108" name="Line 7"/>
+          <p:cNvPr id="65" name="Line 7"/>
           <p:cNvSpPr/>
           <p:nvPr/>
         </p:nvSpPr>
@@ -6067,7 +6109,7 @@
       </p:sp>
       <p:sp>
         <p:nvSpPr>
-          <p:cNvPr id="109" name="Line 8"/>
+          <p:cNvPr id="66" name="Line 8"/>
           <p:cNvSpPr/>
           <p:nvPr/>
         </p:nvSpPr>
@@ -6098,7 +6140,7 @@
       </p:sp>
       <p:sp>
         <p:nvSpPr>
-          <p:cNvPr id="110" name="CustomShape 9"/>
+          <p:cNvPr id="67" name="CustomShape 9"/>
           <p:cNvSpPr/>
           <p:nvPr/>
         </p:nvSpPr>
@@ -6156,13 +6198,13 @@
       </p:sp>
       <p:sp>
         <p:nvSpPr>
-          <p:cNvPr id="111" name="CustomShape 10"/>
-          <p:cNvSpPr/>
-          <p:nvPr/>
-        </p:nvSpPr>
-        <p:spPr>
-          <a:xfrm>
-            <a:off x="7125120" y="3286440"/>
+          <p:cNvPr id="68" name="CustomShape 10"/>
+          <p:cNvSpPr/>
+          <p:nvPr/>
+        </p:nvSpPr>
+        <p:spPr>
+          <a:xfrm>
+            <a:off x="7129800" y="3460320"/>
             <a:ext cx="1086480" cy="364680"/>
           </a:xfrm>
           <a:prstGeom prst="rect">
@@ -6195,7 +6237,7 @@
               </a:lnSpc>
             </a:pPr>
             <a:r>
-              <a:rPr lang="en-US" sz="1800" b="1" strike="noStrike" spc="-1" dirty="0" err="1">
+              <a:rPr lang="en-US" sz="1800" b="1" strike="noStrike" spc="-1">
                 <a:solidFill>
                   <a:srgbClr val="000000"/>
                 </a:solidFill>
@@ -6203,7 +6245,7 @@
               </a:rPr>
               <a:t>Cliente</a:t>
             </a:r>
-            <a:endParaRPr lang="en-US" sz="1800" b="0" strike="noStrike" spc="-1" dirty="0">
+            <a:endParaRPr lang="en-US" sz="1800" b="0" strike="noStrike" spc="-1">
               <a:latin typeface="Arial"/>
             </a:endParaRPr>
           </a:p>
@@ -6211,7 +6253,7 @@
       </p:sp>
       <p:sp>
         <p:nvSpPr>
-          <p:cNvPr id="112" name="CustomShape 11"/>
+          <p:cNvPr id="69" name="CustomShape 11"/>
           <p:cNvSpPr/>
           <p:nvPr/>
         </p:nvSpPr>
@@ -6295,7 +6337,7 @@
       </p:sp>
       <p:sp>
         <p:nvSpPr>
-          <p:cNvPr id="113" name="CustomShape 12"/>
+          <p:cNvPr id="70" name="CustomShape 12"/>
           <p:cNvSpPr/>
           <p:nvPr/>
         </p:nvSpPr>
@@ -6379,14 +6421,14 @@
       </p:sp>
       <p:sp>
         <p:nvSpPr>
-          <p:cNvPr id="114" name="CustomShape 13"/>
-          <p:cNvSpPr/>
-          <p:nvPr/>
-        </p:nvSpPr>
-        <p:spPr>
-          <a:xfrm>
-            <a:off x="2975040" y="4544704"/>
-            <a:ext cx="2281680" cy="1146240"/>
+          <p:cNvPr id="71" name="CustomShape 13"/>
+          <p:cNvSpPr/>
+          <p:nvPr/>
+        </p:nvSpPr>
+        <p:spPr>
+          <a:xfrm>
+            <a:off x="3133703" y="4484420"/>
+            <a:ext cx="1987920" cy="1682479"/>
           </a:xfrm>
           <a:prstGeom prst="rect">
             <a:avLst/>
@@ -6410,19 +6452,6 @@
         <p:txBody>
           <a:bodyPr lIns="90000" tIns="45000" rIns="90000" bIns="45000" anchor="ctr"/>
           <a:lstStyle/>
-          <a:p>
-            <a:pPr marL="360">
-              <a:lnSpc>
-                <a:spcPct val="100000"/>
-              </a:lnSpc>
-              <a:buClr>
-                <a:srgbClr val="000000"/>
-              </a:buClr>
-            </a:pPr>
-            <a:endParaRPr lang="en-US" sz="1800" b="0" strike="noStrike" spc="-1" dirty="0">
-              <a:latin typeface="Arial"/>
-            </a:endParaRPr>
-          </a:p>
           <a:p>
             <a:pPr marL="285840" indent="-285480">
               <a:lnSpc>
@@ -6435,39 +6464,81 @@
               <a:buChar char="•"/>
             </a:pPr>
             <a:r>
-              <a:rPr lang="en-US" sz="1800" b="0" strike="noStrike" spc="-1" dirty="0">
+              <a:rPr lang="en-US" sz="2000" b="0" strike="noStrike" spc="-1" dirty="0" smtClean="0">
                 <a:solidFill>
                   <a:srgbClr val="000000"/>
                 </a:solidFill>
                 <a:latin typeface="Calibri"/>
               </a:rPr>
-              <a:t>Verificar vendas</a:t>
+              <a:t>Cancelar </a:t>
             </a:r>
-            <a:endParaRPr lang="en-US" sz="1800" b="0" strike="noStrike" spc="-1" dirty="0">
+            <a:r>
+              <a:rPr lang="en-US" sz="2000" b="0" strike="noStrike" spc="-1" dirty="0">
+                <a:solidFill>
+                  <a:srgbClr val="000000"/>
+                </a:solidFill>
+                <a:latin typeface="Calibri"/>
+              </a:rPr>
+              <a:t>compra</a:t>
+            </a:r>
+            <a:r>
+              <a:rPr lang="en-US" sz="2000" b="0" strike="noStrike" spc="-1" dirty="0" smtClean="0">
+                <a:solidFill>
+                  <a:srgbClr val="000000"/>
+                </a:solidFill>
+                <a:latin typeface="Calibri"/>
+              </a:rPr>
+              <a:t>.</a:t>
+            </a:r>
+          </a:p>
+          <a:p>
+            <a:pPr marL="285840" indent="-285480">
+              <a:lnSpc>
+                <a:spcPct val="100000"/>
+              </a:lnSpc>
+              <a:buClr>
+                <a:srgbClr val="000000"/>
+              </a:buClr>
+              <a:buFont typeface="Arial"/>
+              <a:buChar char="•"/>
+            </a:pPr>
+            <a:r>
+              <a:rPr lang="en-US" sz="2000" spc="-1" dirty="0" smtClean="0">
+                <a:solidFill>
+                  <a:srgbClr val="000000"/>
+                </a:solidFill>
+                <a:latin typeface="Calibri"/>
+              </a:rPr>
+              <a:t>Trocar produto.</a:t>
+            </a:r>
+            <a:endParaRPr lang="en-US" sz="2000" b="0" strike="noStrike" spc="-1" dirty="0" smtClean="0">
+              <a:solidFill>
+                <a:srgbClr val="000000"/>
+              </a:solidFill>
+              <a:latin typeface="Calibri"/>
+            </a:endParaRPr>
+          </a:p>
+          <a:p>
+            <a:pPr algn="ctr">
+              <a:lnSpc>
+                <a:spcPct val="100000"/>
+              </a:lnSpc>
+            </a:pPr>
+            <a:endParaRPr lang="en-US" sz="2000" b="0" strike="noStrike" spc="-1" dirty="0">
               <a:latin typeface="Arial"/>
             </a:endParaRPr>
           </a:p>
-          <a:p>
-            <a:pPr algn="ctr">
-              <a:lnSpc>
-                <a:spcPct val="100000"/>
-              </a:lnSpc>
-            </a:pPr>
-            <a:endParaRPr lang="en-US" sz="1800" b="0" strike="noStrike" spc="-1" dirty="0">
-              <a:latin typeface="Arial"/>
-            </a:endParaRPr>
-          </a:p>
-        </p:txBody>
-      </p:sp>
-      <p:sp>
-        <p:nvSpPr>
-          <p:cNvPr id="115" name="Line 14"/>
-          <p:cNvSpPr/>
-          <p:nvPr/>
-        </p:nvSpPr>
-        <p:spPr>
-          <a:xfrm flipH="1">
-            <a:off x="0" y="3655440"/>
+        </p:txBody>
+      </p:sp>
+      <p:sp>
+        <p:nvSpPr>
+          <p:cNvPr id="72" name="Line 14"/>
+          <p:cNvSpPr/>
+          <p:nvPr/>
+        </p:nvSpPr>
+        <p:spPr>
+          <a:xfrm>
+            <a:off x="0" y="3829680"/>
             <a:ext cx="9144000" cy="360"/>
           </a:xfrm>
           <a:prstGeom prst="line">
@@ -6494,14 +6565,15 @@
         <p:nvCxnSpPr>
           <p:cNvPr id="3" name="Conector reto 2"/>
           <p:cNvCxnSpPr>
-            <a:stCxn id="104" idx="2"/>
+            <a:stCxn id="61" idx="2"/>
+            <a:endCxn id="71" idx="0"/>
           </p:cNvCxnSpPr>
           <p:nvPr/>
         </p:nvCxnSpPr>
         <p:spPr>
           <a:xfrm flipH="1">
-            <a:off x="4128480" y="2903760"/>
-            <a:ext cx="11160" cy="1640944"/>
+            <a:off x="4127663" y="2903760"/>
+            <a:ext cx="11977" cy="1580660"/>
           </a:xfrm>
           <a:prstGeom prst="line">
             <a:avLst/>
@@ -6528,6 +6600,11 @@
         </p:style>
       </p:cxnSp>
     </p:spTree>
+    <p:extLst>
+      <p:ext uri="{BB962C8B-B14F-4D97-AF65-F5344CB8AC3E}">
+        <p14:creationId xmlns:p14="http://schemas.microsoft.com/office/powerpoint/2010/main" val="658669133"/>
+      </p:ext>
+    </p:extLst>
   </p:cSld>
   <p:clrMapOvr>
     <a:masterClrMapping/>
@@ -6619,6 +6696,9 @@
                 <a:spcPct val="100000"/>
               </a:lnSpc>
             </a:pPr>
+            <a:r>
+              <a:t/>
+            </a:r>
             <a:br/>
             <a:endParaRPr lang="en-US" sz="1800" b="0" strike="noStrike" spc="-1">
               <a:latin typeface="Arial"/>
@@ -6681,15 +6761,6 @@
               <a:buFont typeface="Arial"/>
               <a:buChar char="•"/>
             </a:pPr>
-            <a:r>
-              <a:rPr lang="en-US" sz="1800" b="0" strike="noStrike" spc="-1" dirty="0" err="1">
-                <a:solidFill>
-                  <a:srgbClr val="000000"/>
-                </a:solidFill>
-                <a:latin typeface="Calibri"/>
-              </a:rPr>
-              <a:t>João</a:t>
-            </a:r>
             <a:r>
               <a:rPr lang="en-US" sz="1800" b="0" strike="noStrike" spc="-1" dirty="0">
                 <a:solidFill>
@@ -6697,25 +6768,7 @@
                 </a:solidFill>
                 <a:latin typeface="Calibri"/>
               </a:rPr>
-              <a:t> </a:t>
-            </a:r>
-            <a:r>
-              <a:rPr lang="en-US" sz="1800" b="0" strike="noStrike" spc="-1" dirty="0" err="1">
-                <a:solidFill>
-                  <a:srgbClr val="000000"/>
-                </a:solidFill>
-                <a:latin typeface="Calibri"/>
-              </a:rPr>
-              <a:t>Vitor</a:t>
-            </a:r>
-            <a:r>
-              <a:rPr lang="en-US" sz="1800" b="0" strike="noStrike" spc="-1" dirty="0">
-                <a:solidFill>
-                  <a:srgbClr val="000000"/>
-                </a:solidFill>
-                <a:latin typeface="Calibri"/>
-              </a:rPr>
-              <a:t> Alves Marangoni – 1900946</a:t>
+              <a:t>João Vitor Alves Marangoni – 1900946</a:t>
             </a:r>
             <a:endParaRPr lang="en-US" sz="1800" b="0" strike="noStrike" spc="-1" dirty="0">
               <a:latin typeface="Arial"/>
@@ -6781,22 +6834,13 @@
               <a:buChar char="•"/>
             </a:pPr>
             <a:r>
-              <a:rPr lang="en-US" sz="1800" b="0" strike="noStrike" spc="-1" dirty="0" err="1">
-                <a:solidFill>
-                  <a:srgbClr val="000000"/>
-                </a:solidFill>
-                <a:latin typeface="Calibri"/>
-              </a:rPr>
-              <a:t>Maikon</a:t>
-            </a:r>
-            <a:r>
               <a:rPr lang="en-US" sz="1800" b="0" strike="noStrike" spc="-1" dirty="0">
                 <a:solidFill>
                   <a:srgbClr val="000000"/>
                 </a:solidFill>
                 <a:latin typeface="Calibri"/>
               </a:rPr>
-              <a:t> Silva Muniz – 1901175</a:t>
+              <a:t>Maikon Silva Muniz – 1901175</a:t>
             </a:r>
             <a:endParaRPr lang="en-US" sz="1800" b="0" strike="noStrike" spc="-1" dirty="0">
               <a:latin typeface="Arial"/>

</xml_diff>